<commit_message>
Ordered the episodes chronologically, added videos and links from the day 2, reorganized the material a little bit
</commit_message>
<xml_diff>
--- a/files/episode_1/Akimov-MD.pptx
+++ b/files/episode_1/Akimov-MD.pptx
@@ -237,7 +237,7 @@
           <a:p>
             <a:fld id="{9C6CA092-8592-4C53-A07F-55BE904BB6EF}" type="datetimeFigureOut">
               <a:rPr lang="en-US" smtClean="0"/>
-              <a:t>6/10/2021</a:t>
+              <a:t>6/15/2021</a:t>
             </a:fld>
             <a:endParaRPr lang="en-US"/>
           </a:p>
@@ -834,7 +834,7 @@
           <a:p>
             <a:fld id="{FB445C31-4B7B-4025-A7E9-5F60650FBC7B}" type="datetimeFigureOut">
               <a:rPr lang="en-US" smtClean="0"/>
-              <a:t>6/10/2021</a:t>
+              <a:t>6/15/2021</a:t>
             </a:fld>
             <a:endParaRPr lang="en-US"/>
           </a:p>
@@ -1004,7 +1004,7 @@
           <a:p>
             <a:fld id="{FB445C31-4B7B-4025-A7E9-5F60650FBC7B}" type="datetimeFigureOut">
               <a:rPr lang="en-US" smtClean="0"/>
-              <a:t>6/10/2021</a:t>
+              <a:t>6/15/2021</a:t>
             </a:fld>
             <a:endParaRPr lang="en-US"/>
           </a:p>
@@ -1184,7 +1184,7 @@
           <a:p>
             <a:fld id="{FB445C31-4B7B-4025-A7E9-5F60650FBC7B}" type="datetimeFigureOut">
               <a:rPr lang="en-US" smtClean="0"/>
-              <a:t>6/10/2021</a:t>
+              <a:t>6/15/2021</a:t>
             </a:fld>
             <a:endParaRPr lang="en-US"/>
           </a:p>
@@ -1354,7 +1354,7 @@
           <a:p>
             <a:fld id="{FB445C31-4B7B-4025-A7E9-5F60650FBC7B}" type="datetimeFigureOut">
               <a:rPr lang="en-US" smtClean="0"/>
-              <a:t>6/10/2021</a:t>
+              <a:t>6/15/2021</a:t>
             </a:fld>
             <a:endParaRPr lang="en-US"/>
           </a:p>
@@ -1600,7 +1600,7 @@
           <a:p>
             <a:fld id="{FB445C31-4B7B-4025-A7E9-5F60650FBC7B}" type="datetimeFigureOut">
               <a:rPr lang="en-US" smtClean="0"/>
-              <a:t>6/10/2021</a:t>
+              <a:t>6/15/2021</a:t>
             </a:fld>
             <a:endParaRPr lang="en-US"/>
           </a:p>
@@ -1832,7 +1832,7 @@
           <a:p>
             <a:fld id="{FB445C31-4B7B-4025-A7E9-5F60650FBC7B}" type="datetimeFigureOut">
               <a:rPr lang="en-US" smtClean="0"/>
-              <a:t>6/10/2021</a:t>
+              <a:t>6/15/2021</a:t>
             </a:fld>
             <a:endParaRPr lang="en-US"/>
           </a:p>
@@ -2199,7 +2199,7 @@
           <a:p>
             <a:fld id="{FB445C31-4B7B-4025-A7E9-5F60650FBC7B}" type="datetimeFigureOut">
               <a:rPr lang="en-US" smtClean="0"/>
-              <a:t>6/10/2021</a:t>
+              <a:t>6/15/2021</a:t>
             </a:fld>
             <a:endParaRPr lang="en-US"/>
           </a:p>
@@ -2317,7 +2317,7 @@
           <a:p>
             <a:fld id="{FB445C31-4B7B-4025-A7E9-5F60650FBC7B}" type="datetimeFigureOut">
               <a:rPr lang="en-US" smtClean="0"/>
-              <a:t>6/10/2021</a:t>
+              <a:t>6/15/2021</a:t>
             </a:fld>
             <a:endParaRPr lang="en-US"/>
           </a:p>
@@ -2412,7 +2412,7 @@
           <a:p>
             <a:fld id="{FB445C31-4B7B-4025-A7E9-5F60650FBC7B}" type="datetimeFigureOut">
               <a:rPr lang="en-US" smtClean="0"/>
-              <a:t>6/10/2021</a:t>
+              <a:t>6/15/2021</a:t>
             </a:fld>
             <a:endParaRPr lang="en-US"/>
           </a:p>
@@ -2689,7 +2689,7 @@
           <a:p>
             <a:fld id="{FB445C31-4B7B-4025-A7E9-5F60650FBC7B}" type="datetimeFigureOut">
               <a:rPr lang="en-US" smtClean="0"/>
-              <a:t>6/10/2021</a:t>
+              <a:t>6/15/2021</a:t>
             </a:fld>
             <a:endParaRPr lang="en-US"/>
           </a:p>
@@ -2942,7 +2942,7 @@
           <a:p>
             <a:fld id="{FB445C31-4B7B-4025-A7E9-5F60650FBC7B}" type="datetimeFigureOut">
               <a:rPr lang="en-US" smtClean="0"/>
-              <a:t>6/10/2021</a:t>
+              <a:t>6/15/2021</a:t>
             </a:fld>
             <a:endParaRPr lang="en-US"/>
           </a:p>
@@ -3155,7 +3155,7 @@
           <a:p>
             <a:fld id="{FB445C31-4B7B-4025-A7E9-5F60650FBC7B}" type="datetimeFigureOut">
               <a:rPr lang="en-US" smtClean="0"/>
-              <a:t>6/10/2021</a:t>
+              <a:t>6/15/2021</a:t>
             </a:fld>
             <a:endParaRPr lang="en-US"/>
           </a:p>
@@ -3767,13 +3767,8 @@
             </a:r>
             <a:r>
               <a:rPr lang="en-US" sz="1600" dirty="0"/>
-              <a:t> </a:t>
+              <a:t> Workshop”</a:t>
             </a:r>
-            <a:r>
-              <a:rPr lang="en-US" sz="1600" dirty="0"/>
-              <a:t>Workshop”</a:t>
-            </a:r>
-            <a:endParaRPr lang="en-US" sz="1600" dirty="0"/>
           </a:p>
           <a:p>
             <a:pPr algn="ctr" eaLnBrk="1" hangingPunct="1">
@@ -3790,10 +3785,6 @@
               </a:rPr>
               <a:t>June 14, 2021</a:t>
             </a:r>
-            <a:endParaRPr lang="en-US" altLang="en-US" sz="1800" dirty="0">
-              <a:latin typeface="Times New Roman" panose="02020603050405020304" pitchFamily="18" charset="0"/>
-              <a:cs typeface="Times New Roman" panose="02020603050405020304" pitchFamily="18" charset="0"/>
-            </a:endParaRPr>
           </a:p>
         </p:txBody>
       </p:sp>
@@ -4464,19 +4455,7 @@
               <a:rPr lang="ru-RU" altLang="en-US" sz="1200" i="1" dirty="0">
                 <a:cs typeface="Times New Roman" panose="02020603050405020304" pitchFamily="18" charset="0"/>
               </a:rPr>
-              <a:t>Department of Chemistry, University at </a:t>
-            </a:r>
-            <a:r>
-              <a:rPr lang="ru-RU" altLang="en-US" sz="1200" i="1" dirty="0">
-                <a:cs typeface="Times New Roman" panose="02020603050405020304" pitchFamily="18" charset="0"/>
-              </a:rPr>
-              <a:t>Buffalo</a:t>
-            </a:r>
-            <a:r>
-              <a:rPr lang="ru-RU" altLang="en-US" sz="1200" i="1" dirty="0">
-                <a:cs typeface="Times New Roman" panose="02020603050405020304" pitchFamily="18" charset="0"/>
-              </a:rPr>
-              <a:t>, </a:t>
+              <a:t>Department of Chemistry, University at Buffalo, </a:t>
             </a:r>
             <a:r>
               <a:rPr lang="en-US" altLang="en-US" sz="1200" i="1" dirty="0">
@@ -4623,8 +4602,8 @@
           </a:extLst>
         </p:spPr>
       </p:pic>
-      <mc:AlternateContent xmlns:mc="http://schemas.openxmlformats.org/markup-compatibility/2006">
-        <mc:Choice xmlns:a14="http://schemas.microsoft.com/office/drawing/2010/main" Requires="a14">
+      <mc:AlternateContent xmlns:mc="http://schemas.openxmlformats.org/markup-compatibility/2006" xmlns:a14="http://schemas.microsoft.com/office/drawing/2010/main">
+        <mc:Choice Requires="a14">
           <p:sp>
             <p:nvSpPr>
               <p:cNvPr id="7" name="Rectangle 6"/>
@@ -4646,6 +4625,7 @@
               </a:bodyPr>
               <a:lstStyle/>
               <a:p>
+                <a:pPr/>
                 <a14:m>
                   <m:oMathPara xmlns:m="http://schemas.openxmlformats.org/officeDocument/2006/math">
                     <m:oMathParaPr>
@@ -5223,7 +5203,7 @@
             </p:txBody>
           </p:sp>
         </mc:Choice>
-        <mc:Fallback>
+        <mc:Fallback xmlns="">
           <p:sp>
             <p:nvSpPr>
               <p:cNvPr id="7" name="Rectangle 6"/>
@@ -5262,8 +5242,8 @@
           </p:sp>
         </mc:Fallback>
       </mc:AlternateContent>
-      <mc:AlternateContent xmlns:mc="http://schemas.openxmlformats.org/markup-compatibility/2006">
-        <mc:Choice xmlns:a14="http://schemas.microsoft.com/office/drawing/2010/main" Requires="a14">
+      <mc:AlternateContent xmlns:mc="http://schemas.openxmlformats.org/markup-compatibility/2006" xmlns:a14="http://schemas.microsoft.com/office/drawing/2010/main">
+        <mc:Choice Requires="a14">
           <p:sp>
             <p:nvSpPr>
               <p:cNvPr id="8" name="TextBox 7"/>
@@ -5286,6 +5266,7 @@
               </a:bodyPr>
               <a:lstStyle/>
               <a:p>
+                <a:pPr/>
                 <a14:m>
                   <m:oMathPara xmlns:m="http://schemas.openxmlformats.org/officeDocument/2006/math">
                     <m:oMathParaPr>
@@ -5564,7 +5545,7 @@
             </p:txBody>
           </p:sp>
         </mc:Choice>
-        <mc:Fallback>
+        <mc:Fallback xmlns="">
           <p:sp>
             <p:nvSpPr>
               <p:cNvPr id="8" name="TextBox 7"/>
@@ -5603,8 +5584,8 @@
           </p:sp>
         </mc:Fallback>
       </mc:AlternateContent>
-      <mc:AlternateContent xmlns:mc="http://schemas.openxmlformats.org/markup-compatibility/2006">
-        <mc:Choice xmlns:a14="http://schemas.microsoft.com/office/drawing/2010/main" Requires="a14">
+      <mc:AlternateContent xmlns:mc="http://schemas.openxmlformats.org/markup-compatibility/2006" xmlns:a14="http://schemas.microsoft.com/office/drawing/2010/main">
+        <mc:Choice Requires="a14">
           <p:sp>
             <p:nvSpPr>
               <p:cNvPr id="9" name="TextBox 8"/>
@@ -5627,6 +5608,7 @@
               </a:bodyPr>
               <a:lstStyle/>
               <a:p>
+                <a:pPr/>
                 <a14:m>
                   <m:oMathPara xmlns:m="http://schemas.openxmlformats.org/officeDocument/2006/math">
                     <m:oMathParaPr>
@@ -5920,7 +5902,7 @@
             </p:txBody>
           </p:sp>
         </mc:Choice>
-        <mc:Fallback>
+        <mc:Fallback xmlns="">
           <p:sp>
             <p:nvSpPr>
               <p:cNvPr id="9" name="TextBox 8"/>
@@ -5959,8 +5941,8 @@
           </p:sp>
         </mc:Fallback>
       </mc:AlternateContent>
-      <mc:AlternateContent xmlns:mc="http://schemas.openxmlformats.org/markup-compatibility/2006">
-        <mc:Choice xmlns:a14="http://schemas.microsoft.com/office/drawing/2010/main" Requires="a14">
+      <mc:AlternateContent xmlns:mc="http://schemas.openxmlformats.org/markup-compatibility/2006" xmlns:a14="http://schemas.microsoft.com/office/drawing/2010/main">
+        <mc:Choice Requires="a14">
           <p:sp>
             <p:nvSpPr>
               <p:cNvPr id="10" name="TextBox 9"/>
@@ -5983,6 +5965,7 @@
               </a:bodyPr>
               <a:lstStyle/>
               <a:p>
+                <a:pPr/>
                 <a14:m>
                   <m:oMathPara xmlns:m="http://schemas.openxmlformats.org/officeDocument/2006/math">
                     <m:oMathParaPr>
@@ -6358,7 +6341,7 @@
             </p:txBody>
           </p:sp>
         </mc:Choice>
-        <mc:Fallback>
+        <mc:Fallback xmlns="">
           <p:sp>
             <p:nvSpPr>
               <p:cNvPr id="10" name="TextBox 9"/>
@@ -6457,8 +6440,8 @@
           </a:p>
         </p:txBody>
       </p:sp>
-      <mc:AlternateContent xmlns:mc="http://schemas.openxmlformats.org/markup-compatibility/2006">
-        <mc:Choice xmlns:a14="http://schemas.microsoft.com/office/drawing/2010/main" Requires="a14">
+      <mc:AlternateContent xmlns:mc="http://schemas.openxmlformats.org/markup-compatibility/2006" xmlns:a14="http://schemas.microsoft.com/office/drawing/2010/main">
+        <mc:Choice Requires="a14">
           <p:sp>
             <p:nvSpPr>
               <p:cNvPr id="15" name="TextBox 14"/>
@@ -6481,6 +6464,7 @@
               </a:bodyPr>
               <a:lstStyle/>
               <a:p>
+                <a:pPr/>
                 <a14:m>
                   <m:oMathPara xmlns:m="http://schemas.openxmlformats.org/officeDocument/2006/math">
                     <m:oMathParaPr>
@@ -6588,6 +6572,7 @@
                 <a:endParaRPr lang="en-US" dirty="0" smtClean="0"/>
               </a:p>
               <a:p>
+                <a:pPr/>
                 <a14:m>
                   <m:oMathPara xmlns:m="http://schemas.openxmlformats.org/officeDocument/2006/math">
                     <m:oMathParaPr>
@@ -6642,6 +6627,7 @@
                 <a:endParaRPr lang="en-US" dirty="0"/>
               </a:p>
               <a:p>
+                <a:pPr/>
                 <a14:m>
                   <m:oMathPara xmlns:m="http://schemas.openxmlformats.org/officeDocument/2006/math">
                     <m:oMathParaPr>
@@ -6748,7 +6734,7 @@
             </p:txBody>
           </p:sp>
         </mc:Choice>
-        <mc:Fallback>
+        <mc:Fallback xmlns="">
           <p:sp>
             <p:nvSpPr>
               <p:cNvPr id="15" name="TextBox 14"/>
@@ -6937,8 +6923,8 @@
           </a:extLst>
         </p:spPr>
       </p:pic>
-      <mc:AlternateContent xmlns:mc="http://schemas.openxmlformats.org/markup-compatibility/2006">
-        <mc:Choice xmlns:a14="http://schemas.microsoft.com/office/drawing/2010/main" Requires="a14">
+      <mc:AlternateContent xmlns:mc="http://schemas.openxmlformats.org/markup-compatibility/2006" xmlns:a14="http://schemas.microsoft.com/office/drawing/2010/main">
+        <mc:Choice Requires="a14">
           <p:sp>
             <p:nvSpPr>
               <p:cNvPr id="7" name="Rectangle 6"/>
@@ -6960,6 +6946,7 @@
               </a:bodyPr>
               <a:lstStyle/>
               <a:p>
+                <a:pPr/>
                 <a14:m>
                   <m:oMathPara xmlns:m="http://schemas.openxmlformats.org/officeDocument/2006/math">
                     <m:oMathParaPr>
@@ -7553,7 +7540,7 @@
             </p:txBody>
           </p:sp>
         </mc:Choice>
-        <mc:Fallback>
+        <mc:Fallback xmlns="">
           <p:sp>
             <p:nvSpPr>
               <p:cNvPr id="7" name="Rectangle 6"/>
@@ -7592,8 +7579,8 @@
           </p:sp>
         </mc:Fallback>
       </mc:AlternateContent>
-      <mc:AlternateContent xmlns:mc="http://schemas.openxmlformats.org/markup-compatibility/2006">
-        <mc:Choice xmlns:a14="http://schemas.microsoft.com/office/drawing/2010/main" Requires="a14">
+      <mc:AlternateContent xmlns:mc="http://schemas.openxmlformats.org/markup-compatibility/2006" xmlns:a14="http://schemas.microsoft.com/office/drawing/2010/main">
+        <mc:Choice Requires="a14">
           <p:sp>
             <p:nvSpPr>
               <p:cNvPr id="8" name="TextBox 7"/>
@@ -7616,6 +7603,7 @@
               </a:bodyPr>
               <a:lstStyle/>
               <a:p>
+                <a:pPr/>
                 <a14:m>
                   <m:oMathPara xmlns:m="http://schemas.openxmlformats.org/officeDocument/2006/math">
                     <m:oMathParaPr>
@@ -7885,7 +7873,7 @@
             </p:txBody>
           </p:sp>
         </mc:Choice>
-        <mc:Fallback>
+        <mc:Fallback xmlns="">
           <p:sp>
             <p:nvSpPr>
               <p:cNvPr id="8" name="TextBox 7"/>
@@ -7924,8 +7912,8 @@
           </p:sp>
         </mc:Fallback>
       </mc:AlternateContent>
-      <mc:AlternateContent xmlns:mc="http://schemas.openxmlformats.org/markup-compatibility/2006">
-        <mc:Choice xmlns:a14="http://schemas.microsoft.com/office/drawing/2010/main" Requires="a14">
+      <mc:AlternateContent xmlns:mc="http://schemas.openxmlformats.org/markup-compatibility/2006" xmlns:a14="http://schemas.microsoft.com/office/drawing/2010/main">
+        <mc:Choice Requires="a14">
           <p:sp>
             <p:nvSpPr>
               <p:cNvPr id="9" name="TextBox 8"/>
@@ -7948,6 +7936,7 @@
               </a:bodyPr>
               <a:lstStyle/>
               <a:p>
+                <a:pPr/>
                 <a14:m>
                   <m:oMathPara xmlns:m="http://schemas.openxmlformats.org/officeDocument/2006/math">
                     <m:oMathParaPr>
@@ -8243,7 +8232,7 @@
             </p:txBody>
           </p:sp>
         </mc:Choice>
-        <mc:Fallback>
+        <mc:Fallback xmlns="">
           <p:sp>
             <p:nvSpPr>
               <p:cNvPr id="9" name="TextBox 8"/>
@@ -8342,8 +8331,8 @@
           </a:p>
         </p:txBody>
       </p:sp>
-      <mc:AlternateContent xmlns:mc="http://schemas.openxmlformats.org/markup-compatibility/2006">
-        <mc:Choice xmlns:a14="http://schemas.microsoft.com/office/drawing/2010/main" Requires="a14">
+      <mc:AlternateContent xmlns:mc="http://schemas.openxmlformats.org/markup-compatibility/2006" xmlns:a14="http://schemas.microsoft.com/office/drawing/2010/main">
+        <mc:Choice Requires="a14">
           <p:sp>
             <p:nvSpPr>
               <p:cNvPr id="15" name="TextBox 14"/>
@@ -8366,6 +8355,7 @@
               </a:bodyPr>
               <a:lstStyle/>
               <a:p>
+                <a:pPr/>
                 <a14:m>
                   <m:oMathPara xmlns:m="http://schemas.openxmlformats.org/officeDocument/2006/math">
                     <m:oMathParaPr>
@@ -8531,6 +8521,7 @@
                 <a:endParaRPr lang="en-US" dirty="0"/>
               </a:p>
               <a:p>
+                <a:pPr/>
                 <a14:m>
                   <m:oMathPara xmlns:m="http://schemas.openxmlformats.org/officeDocument/2006/math">
                     <m:oMathParaPr>
@@ -8618,7 +8609,7 @@
             </p:txBody>
           </p:sp>
         </mc:Choice>
-        <mc:Fallback>
+        <mc:Fallback xmlns="">
           <p:sp>
             <p:nvSpPr>
               <p:cNvPr id="15" name="TextBox 14"/>
@@ -8657,8 +8648,8 @@
           </p:sp>
         </mc:Fallback>
       </mc:AlternateContent>
-      <mc:AlternateContent xmlns:mc="http://schemas.openxmlformats.org/markup-compatibility/2006">
-        <mc:Choice xmlns:a14="http://schemas.microsoft.com/office/drawing/2010/main" Requires="a14">
+      <mc:AlternateContent xmlns:mc="http://schemas.openxmlformats.org/markup-compatibility/2006" xmlns:a14="http://schemas.microsoft.com/office/drawing/2010/main">
+        <mc:Choice Requires="a14">
           <p:sp>
             <p:nvSpPr>
               <p:cNvPr id="11" name="TextBox 10"/>
@@ -8681,6 +8672,7 @@
               </a:bodyPr>
               <a:lstStyle/>
               <a:p>
+                <a:pPr/>
                 <a14:m>
                   <m:oMathPara xmlns:m="http://schemas.openxmlformats.org/officeDocument/2006/math">
                     <m:oMathParaPr>
@@ -9034,7 +9026,7 @@
             </p:txBody>
           </p:sp>
         </mc:Choice>
-        <mc:Fallback>
+        <mc:Fallback xmlns="">
           <p:sp>
             <p:nvSpPr>
               <p:cNvPr id="11" name="TextBox 10"/>
@@ -9183,8 +9175,8 @@
           </a:p>
         </p:txBody>
       </p:sp>
-      <mc:AlternateContent xmlns:mc="http://schemas.openxmlformats.org/markup-compatibility/2006">
-        <mc:Choice xmlns:a14="http://schemas.microsoft.com/office/drawing/2010/main" Requires="a14">
+      <mc:AlternateContent xmlns:mc="http://schemas.openxmlformats.org/markup-compatibility/2006" xmlns:a14="http://schemas.microsoft.com/office/drawing/2010/main">
+        <mc:Choice Requires="a14">
           <p:sp>
             <p:nvSpPr>
               <p:cNvPr id="5" name="TextBox 4"/>
@@ -9524,15 +9516,11 @@
                   </a:rPr>
                   <a:t>.</a:t>
                 </a:r>
-                <a:endParaRPr lang="en-US" sz="2800" b="0" dirty="0" smtClean="0">
-                  <a:latin typeface="Arial" panose="020B0604020202020204" pitchFamily="34" charset="0"/>
-                  <a:cs typeface="Arial" panose="020B0604020202020204" pitchFamily="34" charset="0"/>
-                </a:endParaRPr>
               </a:p>
             </p:txBody>
           </p:sp>
         </mc:Choice>
-        <mc:Fallback>
+        <mc:Fallback xmlns="">
           <p:sp>
             <p:nvSpPr>
               <p:cNvPr id="5" name="TextBox 4"/>
@@ -9658,8 +9646,8 @@
           </a:fontRef>
         </p:style>
       </p:cxnSp>
-      <mc:AlternateContent xmlns:mc="http://schemas.openxmlformats.org/markup-compatibility/2006">
-        <mc:Choice xmlns:a14="http://schemas.microsoft.com/office/drawing/2010/main" Requires="a14">
+      <mc:AlternateContent xmlns:mc="http://schemas.openxmlformats.org/markup-compatibility/2006" xmlns:a14="http://schemas.microsoft.com/office/drawing/2010/main">
+        <mc:Choice Requires="a14">
           <p:sp>
             <p:nvSpPr>
               <p:cNvPr id="9" name="TextBox 8"/>
@@ -9719,7 +9707,7 @@
             </p:txBody>
           </p:sp>
         </mc:Choice>
-        <mc:Fallback>
+        <mc:Fallback xmlns="">
           <p:sp>
             <p:nvSpPr>
               <p:cNvPr id="9" name="TextBox 8"/>
@@ -9821,8 +9809,8 @@
           </a:p>
         </p:txBody>
       </p:sp>
-      <mc:AlternateContent xmlns:mc="http://schemas.openxmlformats.org/markup-compatibility/2006">
-        <mc:Choice xmlns:a14="http://schemas.microsoft.com/office/drawing/2010/main" Requires="a14">
+      <mc:AlternateContent xmlns:mc="http://schemas.openxmlformats.org/markup-compatibility/2006" xmlns:a14="http://schemas.microsoft.com/office/drawing/2010/main">
+        <mc:Choice Requires="a14">
           <p:sp>
             <p:nvSpPr>
               <p:cNvPr id="14" name="TextBox 13"/>
@@ -9845,6 +9833,7 @@
               </a:bodyPr>
               <a:lstStyle/>
               <a:p>
+                <a:pPr/>
                 <a14:m>
                   <m:oMathPara xmlns:m="http://schemas.openxmlformats.org/officeDocument/2006/math">
                     <m:oMathParaPr>
@@ -10000,7 +9989,7 @@
             </p:txBody>
           </p:sp>
         </mc:Choice>
-        <mc:Fallback>
+        <mc:Fallback xmlns="">
           <p:sp>
             <p:nvSpPr>
               <p:cNvPr id="14" name="TextBox 13"/>
@@ -10069,8 +10058,8 @@
           </a:p>
         </p:txBody>
       </p:sp>
-      <mc:AlternateContent xmlns:mc="http://schemas.openxmlformats.org/markup-compatibility/2006">
-        <mc:Choice xmlns:a14="http://schemas.microsoft.com/office/drawing/2010/main" Requires="a14">
+      <mc:AlternateContent xmlns:mc="http://schemas.openxmlformats.org/markup-compatibility/2006" xmlns:a14="http://schemas.microsoft.com/office/drawing/2010/main">
+        <mc:Choice Requires="a14">
           <p:sp>
             <p:nvSpPr>
               <p:cNvPr id="16" name="TextBox 15"/>
@@ -10274,13 +10263,7 @@
                       <a:rPr lang="en-US" sz="2800" b="0" i="1" smtClean="0">
                         <a:latin typeface="Cambria Math" panose="02040503050406030204" pitchFamily="18" charset="0"/>
                       </a:rPr>
-                      <m:t>=</m:t>
-                    </m:r>
-                    <m:r>
-                      <a:rPr lang="en-US" sz="2800" b="0" i="1" smtClean="0">
-                        <a:latin typeface="Cambria Math" panose="02040503050406030204" pitchFamily="18" charset="0"/>
-                      </a:rPr>
-                      <m:t>−</m:t>
+                      <m:t>=−</m:t>
                     </m:r>
                     <m:f>
                       <m:fPr>
@@ -10347,15 +10330,11 @@
                   </a:rPr>
                   <a:t>.</a:t>
                 </a:r>
-                <a:endParaRPr lang="en-US" sz="2800" b="0" dirty="0" smtClean="0">
-                  <a:latin typeface="Arial" panose="020B0604020202020204" pitchFamily="34" charset="0"/>
-                  <a:cs typeface="Arial" panose="020B0604020202020204" pitchFamily="34" charset="0"/>
-                </a:endParaRPr>
               </a:p>
             </p:txBody>
           </p:sp>
         </mc:Choice>
-        <mc:Fallback>
+        <mc:Fallback xmlns="">
           <p:sp>
             <p:nvSpPr>
               <p:cNvPr id="16" name="TextBox 15"/>
@@ -10462,8 +10441,8 @@
           </a:p>
         </p:txBody>
       </p:sp>
-      <mc:AlternateContent xmlns:mc="http://schemas.openxmlformats.org/markup-compatibility/2006">
-        <mc:Choice xmlns:a14="http://schemas.microsoft.com/office/drawing/2010/main" Requires="a14">
+      <mc:AlternateContent xmlns:mc="http://schemas.openxmlformats.org/markup-compatibility/2006" xmlns:a14="http://schemas.microsoft.com/office/drawing/2010/main">
+        <mc:Choice Requires="a14">
           <p:sp>
             <p:nvSpPr>
               <p:cNvPr id="19" name="TextBox 18"/>
@@ -10610,13 +10589,7 @@
                       <a:rPr lang="en-US" sz="2800" b="0" i="1" smtClean="0">
                         <a:latin typeface="Cambria Math" panose="02040503050406030204" pitchFamily="18" charset="0"/>
                       </a:rPr>
-                      <m:t>=</m:t>
-                    </m:r>
-                    <m:r>
-                      <a:rPr lang="en-US" sz="2800" b="0" i="1" smtClean="0">
-                        <a:latin typeface="Cambria Math" panose="02040503050406030204" pitchFamily="18" charset="0"/>
-                      </a:rPr>
-                      <m:t>−</m:t>
+                      <m:t>=−</m:t>
                     </m:r>
                     <m:f>
                       <m:fPr>
@@ -10664,15 +10637,11 @@
                   </a:rPr>
                   <a:t>.</a:t>
                 </a:r>
-                <a:endParaRPr lang="en-US" sz="2800" b="0" dirty="0" smtClean="0">
-                  <a:latin typeface="Arial" panose="020B0604020202020204" pitchFamily="34" charset="0"/>
-                  <a:cs typeface="Arial" panose="020B0604020202020204" pitchFamily="34" charset="0"/>
-                </a:endParaRPr>
               </a:p>
             </p:txBody>
           </p:sp>
         </mc:Choice>
-        <mc:Fallback>
+        <mc:Fallback xmlns="">
           <p:sp>
             <p:nvSpPr>
               <p:cNvPr id="19" name="TextBox 18"/>
@@ -10719,7 +10688,7 @@
         </p:nvCxnSpPr>
         <p:spPr>
           <a:xfrm>
-            <a:off x="4373701" y="5544622"/>
+            <a:off x="4527058" y="5595152"/>
             <a:ext cx="1415202" cy="0"/>
           </a:xfrm>
           <a:prstGeom prst="straightConnector1">
@@ -10744,8 +10713,8 @@
           </a:fontRef>
         </p:style>
       </p:cxnSp>
-      <mc:AlternateContent xmlns:mc="http://schemas.openxmlformats.org/markup-compatibility/2006">
-        <mc:Choice xmlns:a14="http://schemas.microsoft.com/office/drawing/2010/main" Requires="a14">
+      <mc:AlternateContent xmlns:mc="http://schemas.openxmlformats.org/markup-compatibility/2006" xmlns:a14="http://schemas.microsoft.com/office/drawing/2010/main">
+        <mc:Choice Requires="a14">
           <p:sp>
             <p:nvSpPr>
               <p:cNvPr id="22" name="TextBox 21"/>
@@ -10768,6 +10737,7 @@
               </a:bodyPr>
               <a:lstStyle/>
               <a:p>
+                <a:pPr/>
                 <a14:m>
                   <m:oMathPara xmlns:m="http://schemas.openxmlformats.org/officeDocument/2006/math">
                     <m:oMathParaPr>
@@ -10884,6 +10854,7 @@
                 <a:endParaRPr lang="en-US" dirty="0" smtClean="0"/>
               </a:p>
               <a:p>
+                <a:pPr/>
                 <a14:m>
                   <m:oMathPara xmlns:m="http://schemas.openxmlformats.org/officeDocument/2006/math">
                     <m:oMathParaPr>
@@ -11002,7 +10973,7 @@
             </p:txBody>
           </p:sp>
         </mc:Choice>
-        <mc:Fallback>
+        <mc:Fallback xmlns="">
           <p:sp>
             <p:nvSpPr>
               <p:cNvPr id="22" name="TextBox 21"/>
@@ -11120,8 +11091,8 @@
           </a:fontRef>
         </p:style>
       </p:cxnSp>
-      <mc:AlternateContent xmlns:mc="http://schemas.openxmlformats.org/markup-compatibility/2006">
-        <mc:Choice xmlns:a14="http://schemas.microsoft.com/office/drawing/2010/main" Requires="a14">
+      <mc:AlternateContent xmlns:mc="http://schemas.openxmlformats.org/markup-compatibility/2006" xmlns:a14="http://schemas.microsoft.com/office/drawing/2010/main">
+        <mc:Choice Requires="a14">
           <p:sp>
             <p:nvSpPr>
               <p:cNvPr id="25" name="TextBox 24"/>
@@ -11144,6 +11115,7 @@
               </a:bodyPr>
               <a:lstStyle/>
               <a:p>
+                <a:pPr/>
                 <a14:m>
                   <m:oMathPara xmlns:m="http://schemas.openxmlformats.org/officeDocument/2006/math">
                     <m:oMathParaPr>
@@ -11194,7 +11166,7 @@
             </p:txBody>
           </p:sp>
         </mc:Choice>
-        <mc:Fallback>
+        <mc:Fallback xmlns="">
           <p:sp>
             <p:nvSpPr>
               <p:cNvPr id="25" name="TextBox 24"/>
@@ -11233,8 +11205,8 @@
           </p:sp>
         </mc:Fallback>
       </mc:AlternateContent>
-      <mc:AlternateContent xmlns:mc="http://schemas.openxmlformats.org/markup-compatibility/2006">
-        <mc:Choice xmlns:a14="http://schemas.microsoft.com/office/drawing/2010/main" Requires="a14">
+      <mc:AlternateContent xmlns:mc="http://schemas.openxmlformats.org/markup-compatibility/2006" xmlns:a14="http://schemas.microsoft.com/office/drawing/2010/main">
+        <mc:Choice Requires="a14">
           <p:sp>
             <p:nvSpPr>
               <p:cNvPr id="27" name="TextBox 26"/>
@@ -11257,6 +11229,7 @@
               </a:bodyPr>
               <a:lstStyle/>
               <a:p>
+                <a:pPr/>
                 <a14:m>
                   <m:oMathPara xmlns:m="http://schemas.openxmlformats.org/officeDocument/2006/math">
                     <m:oMathParaPr>
@@ -11332,7 +11305,7 @@
             </p:txBody>
           </p:sp>
         </mc:Choice>
-        <mc:Fallback>
+        <mc:Fallback xmlns="">
           <p:sp>
             <p:nvSpPr>
               <p:cNvPr id="27" name="TextBox 26"/>
@@ -11410,8 +11383,8 @@
           </a:p>
         </p:txBody>
       </p:sp>
-      <mc:AlternateContent xmlns:mc="http://schemas.openxmlformats.org/markup-compatibility/2006">
-        <mc:Choice xmlns:a14="http://schemas.microsoft.com/office/drawing/2010/main" Requires="a14">
+      <mc:AlternateContent xmlns:mc="http://schemas.openxmlformats.org/markup-compatibility/2006" xmlns:a14="http://schemas.microsoft.com/office/drawing/2010/main">
+        <mc:Choice Requires="a14">
           <p:sp>
             <p:nvSpPr>
               <p:cNvPr id="30" name="TextBox 29"/>
@@ -11434,6 +11407,7 @@
               </a:bodyPr>
               <a:lstStyle/>
               <a:p>
+                <a:pPr/>
                 <a14:m>
                   <m:oMathPara xmlns:m="http://schemas.openxmlformats.org/officeDocument/2006/math">
                     <m:oMathParaPr>
@@ -11533,7 +11507,7 @@
             </p:txBody>
           </p:sp>
         </mc:Choice>
-        <mc:Fallback>
+        <mc:Fallback xmlns="">
           <p:sp>
             <p:nvSpPr>
               <p:cNvPr id="30" name="TextBox 29"/>
@@ -11582,6 +11556,13 @@
   <p:clrMapOvr>
     <a:masterClrMapping/>
   </p:clrMapOvr>
+  <p:timing>
+    <p:tnLst>
+      <p:par>
+        <p:cTn id="1" dur="indefinite" restart="never" nodeType="tmRoot"/>
+      </p:par>
+    </p:tnLst>
+  </p:timing>
 </p:sld>
 </file>
 
@@ -11693,8 +11674,8 @@
           </a:extLst>
         </p:spPr>
       </p:pic>
-      <mc:AlternateContent xmlns:mc="http://schemas.openxmlformats.org/markup-compatibility/2006">
-        <mc:Choice xmlns:a14="http://schemas.microsoft.com/office/drawing/2010/main" Requires="a14">
+      <mc:AlternateContent xmlns:mc="http://schemas.openxmlformats.org/markup-compatibility/2006" xmlns:a14="http://schemas.microsoft.com/office/drawing/2010/main">
+        <mc:Choice Requires="a14">
           <p:sp>
             <p:nvSpPr>
               <p:cNvPr id="2" name="TextBox 1"/>
@@ -11800,7 +11781,7 @@
             </p:txBody>
           </p:sp>
         </mc:Choice>
-        <mc:Fallback>
+        <mc:Fallback xmlns="">
           <p:sp>
             <p:nvSpPr>
               <p:cNvPr id="2" name="TextBox 1"/>
@@ -11839,8 +11820,8 @@
           </p:sp>
         </mc:Fallback>
       </mc:AlternateContent>
-      <mc:AlternateContent xmlns:mc="http://schemas.openxmlformats.org/markup-compatibility/2006">
-        <mc:Choice xmlns:a14="http://schemas.microsoft.com/office/drawing/2010/main" Requires="a14">
+      <mc:AlternateContent xmlns:mc="http://schemas.openxmlformats.org/markup-compatibility/2006" xmlns:a14="http://schemas.microsoft.com/office/drawing/2010/main">
+        <mc:Choice Requires="a14">
           <p:sp>
             <p:nvSpPr>
               <p:cNvPr id="19" name="TextBox 18"/>
@@ -11987,13 +11968,7 @@
                       <a:rPr lang="en-US" sz="2800" b="0" i="1" smtClean="0">
                         <a:latin typeface="Cambria Math" panose="02040503050406030204" pitchFamily="18" charset="0"/>
                       </a:rPr>
-                      <m:t>=</m:t>
-                    </m:r>
-                    <m:r>
-                      <a:rPr lang="en-US" sz="2800" b="0" i="1" smtClean="0">
-                        <a:latin typeface="Cambria Math" panose="02040503050406030204" pitchFamily="18" charset="0"/>
-                      </a:rPr>
-                      <m:t>−</m:t>
+                      <m:t>=−</m:t>
                     </m:r>
                     <m:f>
                       <m:fPr>
@@ -12041,15 +12016,11 @@
                   </a:rPr>
                   <a:t>.</a:t>
                 </a:r>
-                <a:endParaRPr lang="en-US" sz="2800" b="0" dirty="0" smtClean="0">
-                  <a:latin typeface="Arial" panose="020B0604020202020204" pitchFamily="34" charset="0"/>
-                  <a:cs typeface="Arial" panose="020B0604020202020204" pitchFamily="34" charset="0"/>
-                </a:endParaRPr>
               </a:p>
             </p:txBody>
           </p:sp>
         </mc:Choice>
-        <mc:Fallback>
+        <mc:Fallback xmlns="">
           <p:sp>
             <p:nvSpPr>
               <p:cNvPr id="19" name="TextBox 18"/>
@@ -12131,8 +12102,8 @@
           </a:p>
         </p:txBody>
       </p:sp>
-      <mc:AlternateContent xmlns:mc="http://schemas.openxmlformats.org/markup-compatibility/2006">
-        <mc:Choice xmlns:a14="http://schemas.microsoft.com/office/drawing/2010/main" Requires="a14">
+      <mc:AlternateContent xmlns:mc="http://schemas.openxmlformats.org/markup-compatibility/2006" xmlns:a14="http://schemas.microsoft.com/office/drawing/2010/main">
+        <mc:Choice Requires="a14">
           <p:sp>
             <p:nvSpPr>
               <p:cNvPr id="20" name="TextBox 19"/>
@@ -12157,23 +12128,7 @@
               <a:p>
                 <a:r>
                   <a:rPr lang="en-US" b="1" dirty="0" smtClean="0"/>
-                  <a:t>Non-Hamiltonian dynamics </a:t>
-                </a:r>
-                <a:r>
-                  <a:rPr lang="en-US" b="1" dirty="0" smtClean="0"/>
-                  <a:t>(e.g. </a:t>
-                </a:r>
-                <a:r>
-                  <a:rPr lang="en-US" b="1" dirty="0" smtClean="0"/>
-                  <a:t>open/dissipative</a:t>
-                </a:r>
-                <a:r>
-                  <a:rPr lang="en-US" b="1" dirty="0" smtClean="0"/>
-                  <a:t> systems)</a:t>
-                </a:r>
-                <a:r>
-                  <a:rPr lang="en-US" b="1" dirty="0" smtClean="0"/>
-                  <a:t>:</a:t>
+                  <a:t>Non-Hamiltonian dynamics (e.g. open/dissipative systems):</a:t>
                 </a:r>
                 <a:r>
                   <a:rPr lang="en-US" dirty="0" smtClean="0"/>
@@ -12205,7 +12160,7 @@
             </p:txBody>
           </p:sp>
         </mc:Choice>
-        <mc:Fallback>
+        <mc:Fallback xmlns="">
           <p:sp>
             <p:nvSpPr>
               <p:cNvPr id="20" name="TextBox 19"/>
@@ -12244,8 +12199,8 @@
           </p:sp>
         </mc:Fallback>
       </mc:AlternateContent>
-      <mc:AlternateContent xmlns:mc="http://schemas.openxmlformats.org/markup-compatibility/2006">
-        <mc:Choice xmlns:a14="http://schemas.microsoft.com/office/drawing/2010/main" Requires="a14">
+      <mc:AlternateContent xmlns:mc="http://schemas.openxmlformats.org/markup-compatibility/2006" xmlns:a14="http://schemas.microsoft.com/office/drawing/2010/main">
+        <mc:Choice Requires="a14">
           <p:sp>
             <p:nvSpPr>
               <p:cNvPr id="21" name="TextBox 20"/>
@@ -12494,15 +12449,11 @@
                   </a:rPr>
                   <a:t>.</a:t>
                 </a:r>
-                <a:endParaRPr lang="en-US" sz="2800" b="0" dirty="0" smtClean="0">
-                  <a:latin typeface="Arial" panose="020B0604020202020204" pitchFamily="34" charset="0"/>
-                  <a:cs typeface="Arial" panose="020B0604020202020204" pitchFamily="34" charset="0"/>
-                </a:endParaRPr>
               </a:p>
             </p:txBody>
           </p:sp>
         </mc:Choice>
-        <mc:Fallback>
+        <mc:Fallback xmlns="">
           <p:sp>
             <p:nvSpPr>
               <p:cNvPr id="21" name="TextBox 20"/>
@@ -12541,8 +12492,8 @@
           </p:sp>
         </mc:Fallback>
       </mc:AlternateContent>
-      <mc:AlternateContent xmlns:mc="http://schemas.openxmlformats.org/markup-compatibility/2006">
-        <mc:Choice xmlns:a14="http://schemas.microsoft.com/office/drawing/2010/main" Requires="a14">
+      <mc:AlternateContent xmlns:mc="http://schemas.openxmlformats.org/markup-compatibility/2006" xmlns:a14="http://schemas.microsoft.com/office/drawing/2010/main">
+        <mc:Choice Requires="a14">
           <p:sp>
             <p:nvSpPr>
               <p:cNvPr id="22" name="TextBox 21"/>
@@ -12656,7 +12607,7 @@
             </p:txBody>
           </p:sp>
         </mc:Choice>
-        <mc:Fallback>
+        <mc:Fallback xmlns="">
           <p:sp>
             <p:nvSpPr>
               <p:cNvPr id="22" name="TextBox 21"/>
@@ -12735,6 +12686,13 @@
   <p:clrMapOvr>
     <a:masterClrMapping/>
   </p:clrMapOvr>
+  <p:timing>
+    <p:tnLst>
+      <p:par>
+        <p:cTn id="1" dur="indefinite" restart="never" nodeType="tmRoot"/>
+      </p:par>
+    </p:tnLst>
+  </p:timing>
 </p:sld>
 </file>
 
@@ -12853,8 +12811,8 @@
           </a:extLst>
         </p:spPr>
       </p:pic>
-      <mc:AlternateContent xmlns:mc="http://schemas.openxmlformats.org/markup-compatibility/2006">
-        <mc:Choice xmlns:a14="http://schemas.microsoft.com/office/drawing/2010/main" Requires="a14">
+      <mc:AlternateContent xmlns:mc="http://schemas.openxmlformats.org/markup-compatibility/2006" xmlns:a14="http://schemas.microsoft.com/office/drawing/2010/main">
+        <mc:Choice Requires="a14">
           <p:sp>
             <p:nvSpPr>
               <p:cNvPr id="7" name="TextBox 6"/>
@@ -13049,13 +13007,7 @@
                       <a:rPr lang="en-US" sz="2800" b="0" i="1" smtClean="0">
                         <a:latin typeface="Cambria Math" panose="02040503050406030204" pitchFamily="18" charset="0"/>
                       </a:rPr>
-                      <m:t>=</m:t>
-                    </m:r>
-                    <m:r>
-                      <a:rPr lang="en-US" sz="2800" b="0" i="1" smtClean="0">
-                        <a:latin typeface="Cambria Math" panose="02040503050406030204" pitchFamily="18" charset="0"/>
-                      </a:rPr>
-                      <m:t>−</m:t>
+                      <m:t>=−</m:t>
                     </m:r>
                     <m:f>
                       <m:fPr>
@@ -13103,15 +13055,11 @@
                   </a:rPr>
                   <a:t>.</a:t>
                 </a:r>
-                <a:endParaRPr lang="en-US" sz="2800" b="0" dirty="0" smtClean="0">
-                  <a:latin typeface="Arial" panose="020B0604020202020204" pitchFamily="34" charset="0"/>
-                  <a:cs typeface="Arial" panose="020B0604020202020204" pitchFamily="34" charset="0"/>
-                </a:endParaRPr>
               </a:p>
             </p:txBody>
           </p:sp>
         </mc:Choice>
-        <mc:Fallback>
+        <mc:Fallback xmlns="">
           <p:sp>
             <p:nvSpPr>
               <p:cNvPr id="7" name="TextBox 6"/>
@@ -13285,8 +13233,8 @@
           </a:p>
         </p:txBody>
       </p:sp>
-      <mc:AlternateContent xmlns:mc="http://schemas.openxmlformats.org/markup-compatibility/2006">
-        <mc:Choice xmlns:a14="http://schemas.microsoft.com/office/drawing/2010/main" Requires="a14">
+      <mc:AlternateContent xmlns:mc="http://schemas.openxmlformats.org/markup-compatibility/2006" xmlns:a14="http://schemas.microsoft.com/office/drawing/2010/main">
+        <mc:Choice Requires="a14">
           <p:sp>
             <p:nvSpPr>
               <p:cNvPr id="12" name="TextBox 11"/>
@@ -13550,7 +13498,7 @@
             </p:txBody>
           </p:sp>
         </mc:Choice>
-        <mc:Fallback>
+        <mc:Fallback xmlns="">
           <p:sp>
             <p:nvSpPr>
               <p:cNvPr id="12" name="TextBox 11"/>
@@ -13694,8 +13642,8 @@
           </a:p>
         </p:txBody>
       </p:sp>
-      <mc:AlternateContent xmlns:mc="http://schemas.openxmlformats.org/markup-compatibility/2006">
-        <mc:Choice xmlns:a14="http://schemas.microsoft.com/office/drawing/2010/main" Requires="a14">
+      <mc:AlternateContent xmlns:mc="http://schemas.openxmlformats.org/markup-compatibility/2006" xmlns:a14="http://schemas.microsoft.com/office/drawing/2010/main">
+        <mc:Choice Requires="a14">
           <p:sp>
             <p:nvSpPr>
               <p:cNvPr id="20" name="Rectangle 19"/>
@@ -13717,6 +13665,7 @@
               </a:bodyPr>
               <a:lstStyle/>
               <a:p>
+                <a:pPr/>
                 <a14:m>
                   <m:oMathPara xmlns:m="http://schemas.openxmlformats.org/officeDocument/2006/math">
                     <m:oMathParaPr>
@@ -14775,7 +14724,7 @@
             </p:txBody>
           </p:sp>
         </mc:Choice>
-        <mc:Fallback>
+        <mc:Fallback xmlns="">
           <p:sp>
             <p:nvSpPr>
               <p:cNvPr id="20" name="Rectangle 19"/>
@@ -14814,8 +14763,8 @@
           </p:sp>
         </mc:Fallback>
       </mc:AlternateContent>
-      <mc:AlternateContent xmlns:mc="http://schemas.openxmlformats.org/markup-compatibility/2006">
-        <mc:Choice xmlns:a14="http://schemas.microsoft.com/office/drawing/2010/main" Requires="a14">
+      <mc:AlternateContent xmlns:mc="http://schemas.openxmlformats.org/markup-compatibility/2006" xmlns:a14="http://schemas.microsoft.com/office/drawing/2010/main">
+        <mc:Choice Requires="a14">
           <p:sp>
             <p:nvSpPr>
               <p:cNvPr id="21" name="Rectangle 20"/>
@@ -14837,6 +14786,7 @@
               </a:bodyPr>
               <a:lstStyle/>
               <a:p>
+                <a:pPr/>
                 <a14:m>
                   <m:oMathPara xmlns:m="http://schemas.openxmlformats.org/officeDocument/2006/math">
                     <m:oMathParaPr>
@@ -15114,7 +15064,7 @@
             </p:txBody>
           </p:sp>
         </mc:Choice>
-        <mc:Fallback>
+        <mc:Fallback xmlns="">
           <p:sp>
             <p:nvSpPr>
               <p:cNvPr id="21" name="Rectangle 20"/>
@@ -15370,6 +15320,215 @@
           </a:p>
         </p:txBody>
       </p:sp>
+      <mc:AlternateContent xmlns:mc="http://schemas.openxmlformats.org/markup-compatibility/2006">
+        <mc:Choice xmlns:a14="http://schemas.microsoft.com/office/drawing/2010/main" Requires="a14">
+          <p:sp>
+            <p:nvSpPr>
+              <p:cNvPr id="19" name="Rectangle 18"/>
+              <p:cNvSpPr/>
+              <p:nvPr/>
+            </p:nvSpPr>
+            <p:spPr>
+              <a:xfrm>
+                <a:off x="710205" y="5915935"/>
+                <a:ext cx="1694695" cy="705386"/>
+              </a:xfrm>
+              <a:prstGeom prst="rect">
+                <a:avLst/>
+              </a:prstGeom>
+            </p:spPr>
+            <p:txBody>
+              <a:bodyPr wrap="none">
+                <a:spAutoFit/>
+              </a:bodyPr>
+              <a:lstStyle/>
+              <a:p>
+                <a:pPr/>
+                <a14:m>
+                  <m:oMathPara xmlns:m="http://schemas.openxmlformats.org/officeDocument/2006/math">
+                    <m:oMathParaPr>
+                      <m:jc m:val="centerGroup"/>
+                    </m:oMathParaPr>
+                    <m:oMath xmlns:m="http://schemas.openxmlformats.org/officeDocument/2006/math">
+                      <m:r>
+                        <a:rPr lang="en-US" sz="1600" b="0" i="1" smtClean="0">
+                          <a:latin typeface="Cambria Math" panose="02040503050406030204" pitchFamily="18" charset="0"/>
+                        </a:rPr>
+                        <m:t>𝑖𝐿</m:t>
+                      </m:r>
+                      <m:r>
+                        <a:rPr lang="en-US" sz="1600" b="0" i="1" smtClean="0">
+                          <a:latin typeface="Cambria Math" panose="02040503050406030204" pitchFamily="18" charset="0"/>
+                        </a:rPr>
+                        <m:t>=</m:t>
+                      </m:r>
+                      <m:nary>
+                        <m:naryPr>
+                          <m:chr m:val="∑"/>
+                          <m:supHide m:val="on"/>
+                          <m:ctrlPr>
+                            <a:rPr lang="en-US" sz="1600" b="0" i="1" smtClean="0">
+                              <a:latin typeface="Cambria Math" panose="02040503050406030204" pitchFamily="18" charset="0"/>
+                            </a:rPr>
+                          </m:ctrlPr>
+                        </m:naryPr>
+                        <m:sub>
+                          <m:r>
+                            <a:rPr lang="en-US" sz="1600" b="0" i="1" smtClean="0">
+                              <a:latin typeface="Cambria Math" panose="02040503050406030204" pitchFamily="18" charset="0"/>
+                            </a:rPr>
+                            <m:t>𝑖</m:t>
+                          </m:r>
+                        </m:sub>
+                        <m:sup/>
+                        <m:e>
+                          <m:d>
+                            <m:dPr>
+                              <m:ctrlPr>
+                                <a:rPr lang="en-US" sz="1600" b="0" i="1" smtClean="0">
+                                  <a:latin typeface="Cambria Math" panose="02040503050406030204" pitchFamily="18" charset="0"/>
+                                </a:rPr>
+                              </m:ctrlPr>
+                            </m:dPr>
+                            <m:e>
+                              <m:sSub>
+                                <m:sSubPr>
+                                  <m:ctrlPr>
+                                    <a:rPr lang="en-US" sz="1600" b="0" i="1" smtClean="0">
+                                      <a:latin typeface="Cambria Math" panose="02040503050406030204" pitchFamily="18" charset="0"/>
+                                    </a:rPr>
+                                  </m:ctrlPr>
+                                </m:sSubPr>
+                                <m:e>
+                                  <m:acc>
+                                    <m:accPr>
+                                      <m:chr m:val="̇"/>
+                                      <m:ctrlPr>
+                                        <a:rPr lang="en-US" sz="1600" b="0" i="1" smtClean="0">
+                                          <a:latin typeface="Cambria Math" panose="02040503050406030204" pitchFamily="18" charset="0"/>
+                                        </a:rPr>
+                                      </m:ctrlPr>
+                                    </m:accPr>
+                                    <m:e>
+                                      <m:r>
+                                        <a:rPr lang="en-US" sz="1600" b="0" i="1" smtClean="0">
+                                          <a:latin typeface="Cambria Math" panose="02040503050406030204" pitchFamily="18" charset="0"/>
+                                        </a:rPr>
+                                        <m:t>𝑧</m:t>
+                                      </m:r>
+                                    </m:e>
+                                  </m:acc>
+                                </m:e>
+                                <m:sub>
+                                  <m:r>
+                                    <a:rPr lang="en-US" sz="1600" b="0" i="1" smtClean="0">
+                                      <a:latin typeface="Cambria Math" panose="02040503050406030204" pitchFamily="18" charset="0"/>
+                                    </a:rPr>
+                                    <m:t>𝑖</m:t>
+                                  </m:r>
+                                </m:sub>
+                              </m:sSub>
+                              <m:f>
+                                <m:fPr>
+                                  <m:ctrlPr>
+                                    <a:rPr lang="en-US" sz="1600" b="0" i="1" smtClean="0">
+                                      <a:latin typeface="Cambria Math" panose="02040503050406030204" pitchFamily="18" charset="0"/>
+                                    </a:rPr>
+                                  </m:ctrlPr>
+                                </m:fPr>
+                                <m:num>
+                                  <m:r>
+                                    <a:rPr lang="en-US" sz="1600" b="0" i="1" smtClean="0">
+                                      <a:latin typeface="Cambria Math" panose="02040503050406030204" pitchFamily="18" charset="0"/>
+                                    </a:rPr>
+                                    <m:t>𝜕</m:t>
+                                  </m:r>
+                                </m:num>
+                                <m:den>
+                                  <m:r>
+                                    <a:rPr lang="en-US" sz="1600" b="0" i="1" smtClean="0">
+                                      <a:latin typeface="Cambria Math" panose="02040503050406030204" pitchFamily="18" charset="0"/>
+                                    </a:rPr>
+                                    <m:t>𝜕</m:t>
+                                  </m:r>
+                                  <m:sSub>
+                                    <m:sSubPr>
+                                      <m:ctrlPr>
+                                        <a:rPr lang="en-US" sz="1600" b="0" i="1" smtClean="0">
+                                          <a:latin typeface="Cambria Math" panose="02040503050406030204" pitchFamily="18" charset="0"/>
+                                        </a:rPr>
+                                      </m:ctrlPr>
+                                    </m:sSubPr>
+                                    <m:e>
+                                      <m:r>
+                                        <a:rPr lang="en-US" sz="1600" b="0" i="1" smtClean="0">
+                                          <a:latin typeface="Cambria Math" panose="02040503050406030204" pitchFamily="18" charset="0"/>
+                                        </a:rPr>
+                                        <m:t>𝑧</m:t>
+                                      </m:r>
+                                    </m:e>
+                                    <m:sub>
+                                      <m:r>
+                                        <a:rPr lang="en-US" sz="1600" b="0" i="1" smtClean="0">
+                                          <a:latin typeface="Cambria Math" panose="02040503050406030204" pitchFamily="18" charset="0"/>
+                                        </a:rPr>
+                                        <m:t>𝑖</m:t>
+                                      </m:r>
+                                    </m:sub>
+                                  </m:sSub>
+                                </m:den>
+                              </m:f>
+                            </m:e>
+                          </m:d>
+                        </m:e>
+                      </m:nary>
+                    </m:oMath>
+                  </m:oMathPara>
+                </a14:m>
+                <a:endParaRPr lang="en-US" sz="1600" dirty="0"/>
+              </a:p>
+            </p:txBody>
+          </p:sp>
+        </mc:Choice>
+        <mc:Fallback>
+          <p:sp>
+            <p:nvSpPr>
+              <p:cNvPr id="19" name="Rectangle 18"/>
+              <p:cNvSpPr>
+                <a:spLocks noRot="1" noChangeAspect="1" noMove="1" noResize="1" noEditPoints="1" noAdjustHandles="1" noChangeArrowheads="1" noChangeShapeType="1" noTextEdit="1"/>
+              </p:cNvSpPr>
+              <p:nvPr/>
+            </p:nvSpPr>
+            <p:spPr>
+              <a:xfrm>
+                <a:off x="710205" y="5915935"/>
+                <a:ext cx="1694695" cy="705386"/>
+              </a:xfrm>
+              <a:prstGeom prst="rect">
+                <a:avLst/>
+              </a:prstGeom>
+              <a:blipFill>
+                <a:blip r:embed="rId7"/>
+                <a:stretch>
+                  <a:fillRect/>
+                </a:stretch>
+              </a:blipFill>
+            </p:spPr>
+            <p:txBody>
+              <a:bodyPr/>
+              <a:lstStyle/>
+              <a:p>
+                <a:r>
+                  <a:rPr lang="en-US">
+                    <a:noFill/>
+                  </a:rPr>
+                  <a:t> </a:t>
+                </a:r>
+              </a:p>
+            </p:txBody>
+          </p:sp>
+        </mc:Fallback>
+      </mc:AlternateContent>
     </p:spTree>
     <p:extLst>
       <p:ext uri="{BB962C8B-B14F-4D97-AF65-F5344CB8AC3E}">
@@ -15550,8 +15709,8 @@
           </a:p>
         </p:txBody>
       </p:sp>
-      <mc:AlternateContent xmlns:mc="http://schemas.openxmlformats.org/markup-compatibility/2006">
-        <mc:Choice xmlns:a14="http://schemas.microsoft.com/office/drawing/2010/main" Requires="a14">
+      <mc:AlternateContent xmlns:mc="http://schemas.openxmlformats.org/markup-compatibility/2006" xmlns:a14="http://schemas.microsoft.com/office/drawing/2010/main">
+        <mc:Choice Requires="a14">
           <p:sp>
             <p:nvSpPr>
               <p:cNvPr id="8" name="Rectangle 7"/>
@@ -15573,6 +15732,7 @@
               </a:bodyPr>
               <a:lstStyle/>
               <a:p>
+                <a:pPr/>
                 <a14:m>
                   <m:oMathPara xmlns:m="http://schemas.openxmlformats.org/officeDocument/2006/math">
                     <m:oMathParaPr>
@@ -15938,7 +16098,7 @@
             </p:txBody>
           </p:sp>
         </mc:Choice>
-        <mc:Fallback>
+        <mc:Fallback xmlns="">
           <p:sp>
             <p:nvSpPr>
               <p:cNvPr id="8" name="Rectangle 7"/>
@@ -15977,8 +16137,8 @@
           </p:sp>
         </mc:Fallback>
       </mc:AlternateContent>
-      <mc:AlternateContent xmlns:mc="http://schemas.openxmlformats.org/markup-compatibility/2006">
-        <mc:Choice xmlns:a14="http://schemas.microsoft.com/office/drawing/2010/main" Requires="a14">
+      <mc:AlternateContent xmlns:mc="http://schemas.openxmlformats.org/markup-compatibility/2006" xmlns:a14="http://schemas.microsoft.com/office/drawing/2010/main">
+        <mc:Choice Requires="a14">
           <p:sp>
             <p:nvSpPr>
               <p:cNvPr id="10" name="Rectangle 9"/>
@@ -16000,7 +16160,6 @@
               </a:bodyPr>
               <a:lstStyle/>
               <a:p>
-                <a:pPr/>
                 <a:r>
                   <a:rPr lang="en-US" sz="2000" dirty="0" smtClean="0"/>
                   <a:t>More accurately: </a:t>
@@ -16089,7 +16248,7 @@
                     <m:f>
                       <m:fPr>
                         <m:ctrlPr>
-                          <a:rPr lang="en-US" sz="2000" b="0" i="0" smtClean="0">
+                          <a:rPr lang="en-US" sz="2000" b="0" i="1" smtClean="0">
                             <a:latin typeface="Cambria Math" panose="02040503050406030204" pitchFamily="18" charset="0"/>
                           </a:rPr>
                         </m:ctrlPr>
@@ -16171,7 +16330,7 @@
                     <m:f>
                       <m:fPr>
                         <m:ctrlPr>
-                          <a:rPr lang="en-US" sz="2000" b="0" i="0" smtClean="0">
+                          <a:rPr lang="en-US" sz="2000" b="0" i="1" smtClean="0">
                             <a:latin typeface="Cambria Math" panose="02040503050406030204" pitchFamily="18" charset="0"/>
                           </a:rPr>
                         </m:ctrlPr>
@@ -16269,7 +16428,7 @@
             </p:txBody>
           </p:sp>
         </mc:Choice>
-        <mc:Fallback>
+        <mc:Fallback xmlns="">
           <p:sp>
             <p:nvSpPr>
               <p:cNvPr id="10" name="Rectangle 9"/>
@@ -16390,8 +16549,8 @@
           </a:p>
         </p:txBody>
       </p:sp>
-      <mc:AlternateContent xmlns:mc="http://schemas.openxmlformats.org/markup-compatibility/2006">
-        <mc:Choice xmlns:a14="http://schemas.microsoft.com/office/drawing/2010/main" Requires="a14">
+      <mc:AlternateContent xmlns:mc="http://schemas.openxmlformats.org/markup-compatibility/2006" xmlns:a14="http://schemas.microsoft.com/office/drawing/2010/main">
+        <mc:Choice Requires="a14">
           <p:sp>
             <p:nvSpPr>
               <p:cNvPr id="16" name="Rectangle 15"/>
@@ -16644,10 +16803,10 @@
                 <a:endParaRPr lang="en-US" dirty="0" smtClean="0"/>
               </a:p>
               <a:p>
-                <a:pPr/>
                 <a:endParaRPr lang="en-US" dirty="0"/>
               </a:p>
               <a:p>
+                <a:pPr/>
                 <a14:m>
                   <m:oMathPara xmlns:m="http://schemas.openxmlformats.org/officeDocument/2006/math">
                     <m:oMathParaPr>
@@ -16843,7 +17002,7 @@
             </p:txBody>
           </p:sp>
         </mc:Choice>
-        <mc:Fallback>
+        <mc:Fallback xmlns="">
           <p:sp>
             <p:nvSpPr>
               <p:cNvPr id="16" name="Rectangle 15"/>
@@ -16882,8 +17041,8 @@
           </p:sp>
         </mc:Fallback>
       </mc:AlternateContent>
-      <mc:AlternateContent xmlns:mc="http://schemas.openxmlformats.org/markup-compatibility/2006">
-        <mc:Choice xmlns:a14="http://schemas.microsoft.com/office/drawing/2010/main" Requires="a14">
+      <mc:AlternateContent xmlns:mc="http://schemas.openxmlformats.org/markup-compatibility/2006" xmlns:a14="http://schemas.microsoft.com/office/drawing/2010/main">
+        <mc:Choice Requires="a14">
           <p:sp>
             <p:nvSpPr>
               <p:cNvPr id="17" name="TextBox 16"/>
@@ -17015,7 +17174,7 @@
             </p:txBody>
           </p:sp>
         </mc:Choice>
-        <mc:Fallback>
+        <mc:Fallback xmlns="">
           <p:sp>
             <p:nvSpPr>
               <p:cNvPr id="17" name="TextBox 16"/>
@@ -17087,8 +17246,8 @@
           </a:p>
         </p:txBody>
       </p:sp>
-      <mc:AlternateContent xmlns:mc="http://schemas.openxmlformats.org/markup-compatibility/2006">
-        <mc:Choice xmlns:a14="http://schemas.microsoft.com/office/drawing/2010/main" Requires="a14">
+      <mc:AlternateContent xmlns:mc="http://schemas.openxmlformats.org/markup-compatibility/2006" xmlns:a14="http://schemas.microsoft.com/office/drawing/2010/main">
+        <mc:Choice Requires="a14">
           <p:sp>
             <p:nvSpPr>
               <p:cNvPr id="19" name="TextBox 18"/>
@@ -17321,7 +17480,7 @@
             </p:txBody>
           </p:sp>
         </mc:Choice>
-        <mc:Fallback>
+        <mc:Fallback xmlns="">
           <p:sp>
             <p:nvSpPr>
               <p:cNvPr id="19" name="TextBox 18"/>
@@ -17390,8 +17549,8 @@
           <a:chExt cx="0" cy="0"/>
         </a:xfrm>
       </p:grpSpPr>
-      <mc:AlternateContent xmlns:mc="http://schemas.openxmlformats.org/markup-compatibility/2006">
-        <mc:Choice xmlns:a14="http://schemas.microsoft.com/office/drawing/2010/main" Requires="a14">
+      <mc:AlternateContent xmlns:mc="http://schemas.openxmlformats.org/markup-compatibility/2006" xmlns:a14="http://schemas.microsoft.com/office/drawing/2010/main">
+        <mc:Choice Requires="a14">
           <p:sp>
             <p:nvSpPr>
               <p:cNvPr id="4" name="Rectangle 3"/>
@@ -17815,7 +17974,7 @@
             </p:txBody>
           </p:sp>
         </mc:Choice>
-        <mc:Fallback>
+        <mc:Fallback xmlns="">
           <p:sp>
             <p:nvSpPr>
               <p:cNvPr id="4" name="Rectangle 3"/>
@@ -17854,8 +18013,8 @@
           </p:sp>
         </mc:Fallback>
       </mc:AlternateContent>
-      <mc:AlternateContent xmlns:mc="http://schemas.openxmlformats.org/markup-compatibility/2006">
-        <mc:Choice xmlns:a14="http://schemas.microsoft.com/office/drawing/2010/main" Requires="a14">
+      <mc:AlternateContent xmlns:mc="http://schemas.openxmlformats.org/markup-compatibility/2006" xmlns:a14="http://schemas.microsoft.com/office/drawing/2010/main">
+        <mc:Choice Requires="a14">
           <p:sp>
             <p:nvSpPr>
               <p:cNvPr id="5" name="Rectangle 4"/>
@@ -18279,7 +18438,7 @@
             </p:txBody>
           </p:sp>
         </mc:Choice>
-        <mc:Fallback>
+        <mc:Fallback xmlns="">
           <p:sp>
             <p:nvSpPr>
               <p:cNvPr id="5" name="Rectangle 4"/>
@@ -18318,8 +18477,8 @@
           </p:sp>
         </mc:Fallback>
       </mc:AlternateContent>
-      <mc:AlternateContent xmlns:mc="http://schemas.openxmlformats.org/markup-compatibility/2006">
-        <mc:Choice xmlns:a14="http://schemas.microsoft.com/office/drawing/2010/main" Requires="a14">
+      <mc:AlternateContent xmlns:mc="http://schemas.openxmlformats.org/markup-compatibility/2006" xmlns:a14="http://schemas.microsoft.com/office/drawing/2010/main">
+        <mc:Choice Requires="a14">
           <p:sp>
             <p:nvSpPr>
               <p:cNvPr id="6" name="Rectangle 5"/>
@@ -18608,13 +18767,7 @@
                         <a:rPr lang="en-US" sz="2000" b="0" i="1" smtClean="0">
                           <a:latin typeface="Cambria Math" panose="02040503050406030204" pitchFamily="18" charset="0"/>
                         </a:rPr>
-                        <m:t>)=</m:t>
-                      </m:r>
-                      <m:r>
-                        <a:rPr lang="en-US" sz="2000" b="0" i="1" smtClean="0">
-                          <a:latin typeface="Cambria Math" panose="02040503050406030204" pitchFamily="18" charset="0"/>
-                        </a:rPr>
-                        <m:t>2</m:t>
+                        <m:t>)=2</m:t>
                       </m:r>
                       <m:r>
                         <a:rPr lang="en-US" sz="2000" b="0" i="1" smtClean="0">
@@ -18787,7 +18940,7 @@
             </p:txBody>
           </p:sp>
         </mc:Choice>
-        <mc:Fallback>
+        <mc:Fallback xmlns="">
           <p:sp>
             <p:nvSpPr>
               <p:cNvPr id="6" name="Rectangle 5"/>
@@ -18864,8 +19017,8 @@
           </a:p>
         </p:txBody>
       </p:sp>
-      <mc:AlternateContent xmlns:mc="http://schemas.openxmlformats.org/markup-compatibility/2006">
-        <mc:Choice xmlns:a14="http://schemas.microsoft.com/office/drawing/2010/main" Requires="a14">
+      <mc:AlternateContent xmlns:mc="http://schemas.openxmlformats.org/markup-compatibility/2006" xmlns:a14="http://schemas.microsoft.com/office/drawing/2010/main">
+        <mc:Choice Requires="a14">
           <p:sp>
             <p:nvSpPr>
               <p:cNvPr id="10" name="Rectangle 9"/>
@@ -19123,7 +19276,7 @@
                       <m:sSup>
                         <m:sSupPr>
                           <m:ctrlPr>
-                            <a:rPr lang="en-US" sz="2400" b="1" i="0" smtClean="0">
+                            <a:rPr lang="en-US" sz="2400" b="1" i="1" smtClean="0">
                               <a:latin typeface="Cambria Math" panose="02040503050406030204" pitchFamily="18" charset="0"/>
                             </a:rPr>
                           </m:ctrlPr>
@@ -19159,7 +19312,7 @@
             </p:txBody>
           </p:sp>
         </mc:Choice>
-        <mc:Fallback>
+        <mc:Fallback xmlns="">
           <p:sp>
             <p:nvSpPr>
               <p:cNvPr id="10" name="Rectangle 9"/>
@@ -19351,8 +19504,8 @@
           </a:p>
         </p:txBody>
       </p:sp>
-      <mc:AlternateContent xmlns:mc="http://schemas.openxmlformats.org/markup-compatibility/2006">
-        <mc:Choice xmlns:a14="http://schemas.microsoft.com/office/drawing/2010/main" Requires="a14">
+      <mc:AlternateContent xmlns:mc="http://schemas.openxmlformats.org/markup-compatibility/2006" xmlns:a14="http://schemas.microsoft.com/office/drawing/2010/main">
+        <mc:Choice Requires="a14">
           <p:sp>
             <p:nvSpPr>
               <p:cNvPr id="14" name="TextBox 13"/>
@@ -19658,7 +19811,7 @@
             </p:txBody>
           </p:sp>
         </mc:Choice>
-        <mc:Fallback>
+        <mc:Fallback xmlns="">
           <p:sp>
             <p:nvSpPr>
               <p:cNvPr id="14" name="TextBox 13"/>
@@ -20021,8 +20174,8 @@
           </a:extLst>
         </p:spPr>
       </p:pic>
-      <mc:AlternateContent xmlns:mc="http://schemas.openxmlformats.org/markup-compatibility/2006">
-        <mc:Choice xmlns:a14="http://schemas.microsoft.com/office/drawing/2010/main" Requires="a14">
+      <mc:AlternateContent xmlns:mc="http://schemas.openxmlformats.org/markup-compatibility/2006" xmlns:a14="http://schemas.microsoft.com/office/drawing/2010/main">
+        <mc:Choice Requires="a14">
           <p:sp>
             <p:nvSpPr>
               <p:cNvPr id="6" name="TextBox 5"/>
@@ -20289,7 +20442,7 @@
             </p:txBody>
           </p:sp>
         </mc:Choice>
-        <mc:Fallback>
+        <mc:Fallback xmlns="">
           <p:sp>
             <p:nvSpPr>
               <p:cNvPr id="6" name="TextBox 5"/>
@@ -20358,8 +20511,8 @@
           </a:p>
         </p:txBody>
       </p:sp>
-      <mc:AlternateContent xmlns:mc="http://schemas.openxmlformats.org/markup-compatibility/2006">
-        <mc:Choice xmlns:a14="http://schemas.microsoft.com/office/drawing/2010/main" Requires="a14">
+      <mc:AlternateContent xmlns:mc="http://schemas.openxmlformats.org/markup-compatibility/2006" xmlns:a14="http://schemas.microsoft.com/office/drawing/2010/main">
+        <mc:Choice Requires="a14">
           <p:sp>
             <p:nvSpPr>
               <p:cNvPr id="8" name="Rectangle 7"/>
@@ -20381,6 +20534,7 @@
               </a:bodyPr>
               <a:lstStyle/>
               <a:p>
+                <a:pPr/>
                 <a14:m>
                   <m:oMathPara xmlns:m="http://schemas.openxmlformats.org/officeDocument/2006/math">
                     <m:oMathParaPr>
@@ -20449,7 +20603,7 @@
             </p:txBody>
           </p:sp>
         </mc:Choice>
-        <mc:Fallback>
+        <mc:Fallback xmlns="">
           <p:sp>
             <p:nvSpPr>
               <p:cNvPr id="8" name="Rectangle 7"/>
@@ -20488,8 +20642,8 @@
           </p:sp>
         </mc:Fallback>
       </mc:AlternateContent>
-      <mc:AlternateContent xmlns:mc="http://schemas.openxmlformats.org/markup-compatibility/2006">
-        <mc:Choice xmlns:a14="http://schemas.microsoft.com/office/drawing/2010/main" Requires="a14">
+      <mc:AlternateContent xmlns:mc="http://schemas.openxmlformats.org/markup-compatibility/2006" xmlns:a14="http://schemas.microsoft.com/office/drawing/2010/main">
+        <mc:Choice Requires="a14">
           <p:sp>
             <p:nvSpPr>
               <p:cNvPr id="9" name="Rectangle 8"/>
@@ -20511,6 +20665,7 @@
               </a:bodyPr>
               <a:lstStyle/>
               <a:p>
+                <a:pPr/>
                 <a14:m>
                   <m:oMathPara xmlns:m="http://schemas.openxmlformats.org/officeDocument/2006/math">
                     <m:oMathParaPr>
@@ -20830,7 +20985,7 @@
             </p:txBody>
           </p:sp>
         </mc:Choice>
-        <mc:Fallback>
+        <mc:Fallback xmlns="">
           <p:sp>
             <p:nvSpPr>
               <p:cNvPr id="9" name="Rectangle 8"/>
@@ -20929,8 +21084,8 @@
           </a:p>
         </p:txBody>
       </p:sp>
-      <mc:AlternateContent xmlns:mc="http://schemas.openxmlformats.org/markup-compatibility/2006">
-        <mc:Choice xmlns:a14="http://schemas.microsoft.com/office/drawing/2010/main" Requires="a14">
+      <mc:AlternateContent xmlns:mc="http://schemas.openxmlformats.org/markup-compatibility/2006" xmlns:a14="http://schemas.microsoft.com/office/drawing/2010/main">
+        <mc:Choice Requires="a14">
           <p:sp>
             <p:nvSpPr>
               <p:cNvPr id="12" name="TextBox 11"/>
@@ -21353,7 +21508,7 @@
             </p:txBody>
           </p:sp>
         </mc:Choice>
-        <mc:Fallback>
+        <mc:Fallback xmlns="">
           <p:sp>
             <p:nvSpPr>
               <p:cNvPr id="12" name="TextBox 11"/>
@@ -21392,8 +21547,8 @@
           </p:sp>
         </mc:Fallback>
       </mc:AlternateContent>
-      <mc:AlternateContent xmlns:mc="http://schemas.openxmlformats.org/markup-compatibility/2006">
-        <mc:Choice xmlns:a14="http://schemas.microsoft.com/office/drawing/2010/main" Requires="a14">
+      <mc:AlternateContent xmlns:mc="http://schemas.openxmlformats.org/markup-compatibility/2006" xmlns:a14="http://schemas.microsoft.com/office/drawing/2010/main">
+        <mc:Choice Requires="a14">
           <p:sp>
             <p:nvSpPr>
               <p:cNvPr id="13" name="Rectangle 12"/>
@@ -21415,6 +21570,7 @@
               </a:bodyPr>
               <a:lstStyle/>
               <a:p>
+                <a:pPr/>
                 <a14:m>
                   <m:oMathPara xmlns:m="http://schemas.openxmlformats.org/officeDocument/2006/math">
                     <m:oMathParaPr>
@@ -21633,13 +21789,7 @@
                                 <a:rPr lang="en-US" i="1">
                                   <a:latin typeface="Cambria Math" panose="02040503050406030204" pitchFamily="18" charset="0"/>
                                 </a:rPr>
-                                <m:t>𝑡</m:t>
-                              </m:r>
-                              <m:r>
-                                <a:rPr lang="en-US" i="1">
-                                  <a:latin typeface="Cambria Math" panose="02040503050406030204" pitchFamily="18" charset="0"/>
-                                </a:rPr>
-                                <m:t>𝐹</m:t>
+                                <m:t>𝑡𝐹</m:t>
                               </m:r>
                               <m:f>
                                 <m:fPr>
@@ -22013,7 +22163,7 @@
             </p:txBody>
           </p:sp>
         </mc:Choice>
-        <mc:Fallback>
+        <mc:Fallback xmlns="">
           <p:sp>
             <p:nvSpPr>
               <p:cNvPr id="13" name="Rectangle 12"/>
@@ -22169,8 +22319,8 @@
           </a:extLst>
         </p:spPr>
       </p:pic>
-      <mc:AlternateContent xmlns:mc="http://schemas.openxmlformats.org/markup-compatibility/2006">
-        <mc:Choice xmlns:a14="http://schemas.microsoft.com/office/drawing/2010/main" Requires="a14">
+      <mc:AlternateContent xmlns:mc="http://schemas.openxmlformats.org/markup-compatibility/2006" xmlns:a14="http://schemas.microsoft.com/office/drawing/2010/main">
+        <mc:Choice Requires="a14">
           <p:sp>
             <p:nvSpPr>
               <p:cNvPr id="6" name="Rectangle 5"/>
@@ -22192,6 +22342,7 @@
               </a:bodyPr>
               <a:lstStyle/>
               <a:p>
+                <a:pPr/>
                 <a14:m>
                   <m:oMathPara xmlns:m="http://schemas.openxmlformats.org/officeDocument/2006/math">
                     <m:oMathParaPr>
@@ -22878,7 +23029,7 @@
             </p:txBody>
           </p:sp>
         </mc:Choice>
-        <mc:Fallback>
+        <mc:Fallback xmlns="">
           <p:sp>
             <p:nvSpPr>
               <p:cNvPr id="6" name="Rectangle 5"/>
@@ -22917,8 +23068,8 @@
           </p:sp>
         </mc:Fallback>
       </mc:AlternateContent>
-      <mc:AlternateContent xmlns:mc="http://schemas.openxmlformats.org/markup-compatibility/2006">
-        <mc:Choice xmlns:a14="http://schemas.microsoft.com/office/drawing/2010/main" Requires="a14">
+      <mc:AlternateContent xmlns:mc="http://schemas.openxmlformats.org/markup-compatibility/2006" xmlns:a14="http://schemas.microsoft.com/office/drawing/2010/main">
+        <mc:Choice Requires="a14">
           <p:sp>
             <p:nvSpPr>
               <p:cNvPr id="7" name="TextBox 6"/>
@@ -22970,7 +23121,7 @@
             </p:txBody>
           </p:sp>
         </mc:Choice>
-        <mc:Fallback>
+        <mc:Fallback xmlns="">
           <p:sp>
             <p:nvSpPr>
               <p:cNvPr id="7" name="TextBox 6"/>
@@ -23009,8 +23160,8 @@
           </p:sp>
         </mc:Fallback>
       </mc:AlternateContent>
-      <mc:AlternateContent xmlns:mc="http://schemas.openxmlformats.org/markup-compatibility/2006">
-        <mc:Choice xmlns:a14="http://schemas.microsoft.com/office/drawing/2010/main" Requires="a14">
+      <mc:AlternateContent xmlns:mc="http://schemas.openxmlformats.org/markup-compatibility/2006" xmlns:a14="http://schemas.microsoft.com/office/drawing/2010/main">
+        <mc:Choice Requires="a14">
           <p:sp>
             <p:nvSpPr>
               <p:cNvPr id="8" name="Rectangle 7"/>
@@ -23032,6 +23183,7 @@
               </a:bodyPr>
               <a:lstStyle/>
               <a:p>
+                <a:pPr/>
                 <a14:m>
                   <m:oMathPara xmlns:m="http://schemas.openxmlformats.org/officeDocument/2006/math">
                     <m:oMathParaPr>
@@ -23198,7 +23350,7 @@
             </p:txBody>
           </p:sp>
         </mc:Choice>
-        <mc:Fallback>
+        <mc:Fallback xmlns="">
           <p:sp>
             <p:nvSpPr>
               <p:cNvPr id="8" name="Rectangle 7"/>
@@ -23297,8 +23449,8 @@
           </a:p>
         </p:txBody>
       </p:sp>
-      <mc:AlternateContent xmlns:mc="http://schemas.openxmlformats.org/markup-compatibility/2006">
-        <mc:Choice xmlns:a14="http://schemas.microsoft.com/office/drawing/2010/main" Requires="a14">
+      <mc:AlternateContent xmlns:mc="http://schemas.openxmlformats.org/markup-compatibility/2006" xmlns:a14="http://schemas.microsoft.com/office/drawing/2010/main">
+        <mc:Choice Requires="a14">
           <p:sp>
             <p:nvSpPr>
               <p:cNvPr id="11" name="Rectangle 10"/>
@@ -23320,6 +23472,7 @@
               </a:bodyPr>
               <a:lstStyle/>
               <a:p>
+                <a:pPr/>
                 <a14:m>
                   <m:oMathPara xmlns:m="http://schemas.openxmlformats.org/officeDocument/2006/math">
                     <m:oMathParaPr>
@@ -23486,7 +23639,7 @@
             </p:txBody>
           </p:sp>
         </mc:Choice>
-        <mc:Fallback>
+        <mc:Fallback xmlns="">
           <p:sp>
             <p:nvSpPr>
               <p:cNvPr id="11" name="Rectangle 10"/>

</xml_diff>